<commit_message>
Update the variant calling lecture and lab, and insert pdf of vc_slide in schedule
</commit_message>
<xml_diff>
--- a/slide_vc_discussion.pptx
+++ b/slide_vc_discussion.pptx
@@ -6,14 +6,12 @@
   </p:sldMasterIdLst>
   <p:sldIdLst>
     <p:sldId id="256" r:id="rId2"/>
-    <p:sldId id="259" r:id="rId3"/>
-    <p:sldId id="260" r:id="rId4"/>
-    <p:sldId id="261" r:id="rId5"/>
-    <p:sldId id="265" r:id="rId6"/>
-    <p:sldId id="258" r:id="rId7"/>
-    <p:sldId id="262" r:id="rId8"/>
-    <p:sldId id="263" r:id="rId9"/>
-    <p:sldId id="264" r:id="rId10"/>
+    <p:sldId id="261" r:id="rId3"/>
+    <p:sldId id="265" r:id="rId4"/>
+    <p:sldId id="258" r:id="rId5"/>
+    <p:sldId id="262" r:id="rId6"/>
+    <p:sldId id="263" r:id="rId7"/>
+    <p:sldId id="264" r:id="rId8"/>
   </p:sldIdLst>
   <p:sldSz cx="9144000" cy="6858000" type="screen4x3"/>
   <p:notesSz cx="6858000" cy="9144000"/>
@@ -169,7 +167,7 @@
           <a:lstStyle/>
           <a:p>
             <a:r>
-              <a:rPr lang="sv-SE" smtClean="0"/>
+              <a:rPr lang="sv-SE"/>
               <a:t>Click to edit Master title style</a:t>
             </a:r>
             <a:endParaRPr lang="en-US"/>
@@ -288,7 +286,7 @@
           </a:lstStyle>
           <a:p>
             <a:r>
-              <a:rPr lang="sv-SE" smtClean="0"/>
+              <a:rPr lang="sv-SE"/>
               <a:t>Click to edit Master subtitle style</a:t>
             </a:r>
             <a:endParaRPr lang="en-US"/>
@@ -312,7 +310,7 @@
           <a:p>
             <a:fld id="{004859A0-F9C5-444E-AFA2-7F6F6B24A885}" type="datetimeFigureOut">
               <a:rPr lang="en-US" smtClean="0"/>
-              <a:t>9/10/19</a:t>
+              <a:t>10/15/20</a:t>
             </a:fld>
             <a:endParaRPr lang="en-US"/>
           </a:p>
@@ -406,7 +404,7 @@
           <a:lstStyle/>
           <a:p>
             <a:r>
-              <a:rPr lang="sv-SE" smtClean="0"/>
+              <a:rPr lang="sv-SE"/>
               <a:t>Click to edit Master title style</a:t>
             </a:r>
             <a:endParaRPr lang="en-US"/>
@@ -430,35 +428,35 @@
           <a:p>
             <a:pPr lvl="0"/>
             <a:r>
-              <a:rPr lang="sv-SE" smtClean="0"/>
+              <a:rPr lang="sv-SE"/>
               <a:t>Click to edit Master text styles</a:t>
             </a:r>
           </a:p>
           <a:p>
             <a:pPr lvl="1"/>
             <a:r>
-              <a:rPr lang="sv-SE" smtClean="0"/>
+              <a:rPr lang="sv-SE"/>
               <a:t>Second level</a:t>
             </a:r>
           </a:p>
           <a:p>
             <a:pPr lvl="2"/>
             <a:r>
-              <a:rPr lang="sv-SE" smtClean="0"/>
+              <a:rPr lang="sv-SE"/>
               <a:t>Third level</a:t>
             </a:r>
           </a:p>
           <a:p>
             <a:pPr lvl="3"/>
             <a:r>
-              <a:rPr lang="sv-SE" smtClean="0"/>
+              <a:rPr lang="sv-SE"/>
               <a:t>Fourth level</a:t>
             </a:r>
           </a:p>
           <a:p>
             <a:pPr lvl="4"/>
             <a:r>
-              <a:rPr lang="sv-SE" smtClean="0"/>
+              <a:rPr lang="sv-SE"/>
               <a:t>Fifth level</a:t>
             </a:r>
             <a:endParaRPr lang="en-US"/>
@@ -482,7 +480,7 @@
           <a:p>
             <a:fld id="{004859A0-F9C5-444E-AFA2-7F6F6B24A885}" type="datetimeFigureOut">
               <a:rPr lang="en-US" smtClean="0"/>
-              <a:t>9/10/19</a:t>
+              <a:t>10/15/20</a:t>
             </a:fld>
             <a:endParaRPr lang="en-US"/>
           </a:p>
@@ -581,7 +579,7 @@
           <a:lstStyle/>
           <a:p>
             <a:r>
-              <a:rPr lang="sv-SE" smtClean="0"/>
+              <a:rPr lang="sv-SE"/>
               <a:t>Click to edit Master title style</a:t>
             </a:r>
             <a:endParaRPr lang="en-US"/>
@@ -610,35 +608,35 @@
           <a:p>
             <a:pPr lvl="0"/>
             <a:r>
-              <a:rPr lang="sv-SE" smtClean="0"/>
+              <a:rPr lang="sv-SE"/>
               <a:t>Click to edit Master text styles</a:t>
             </a:r>
           </a:p>
           <a:p>
             <a:pPr lvl="1"/>
             <a:r>
-              <a:rPr lang="sv-SE" smtClean="0"/>
+              <a:rPr lang="sv-SE"/>
               <a:t>Second level</a:t>
             </a:r>
           </a:p>
           <a:p>
             <a:pPr lvl="2"/>
             <a:r>
-              <a:rPr lang="sv-SE" smtClean="0"/>
+              <a:rPr lang="sv-SE"/>
               <a:t>Third level</a:t>
             </a:r>
           </a:p>
           <a:p>
             <a:pPr lvl="3"/>
             <a:r>
-              <a:rPr lang="sv-SE" smtClean="0"/>
+              <a:rPr lang="sv-SE"/>
               <a:t>Fourth level</a:t>
             </a:r>
           </a:p>
           <a:p>
             <a:pPr lvl="4"/>
             <a:r>
-              <a:rPr lang="sv-SE" smtClean="0"/>
+              <a:rPr lang="sv-SE"/>
               <a:t>Fifth level</a:t>
             </a:r>
             <a:endParaRPr lang="en-US"/>
@@ -662,7 +660,7 @@
           <a:p>
             <a:fld id="{004859A0-F9C5-444E-AFA2-7F6F6B24A885}" type="datetimeFigureOut">
               <a:rPr lang="en-US" smtClean="0"/>
-              <a:t>9/10/19</a:t>
+              <a:t>10/15/20</a:t>
             </a:fld>
             <a:endParaRPr lang="en-US"/>
           </a:p>
@@ -756,7 +754,7 @@
           <a:lstStyle/>
           <a:p>
             <a:r>
-              <a:rPr lang="sv-SE" smtClean="0"/>
+              <a:rPr lang="sv-SE"/>
               <a:t>Click to edit Master title style</a:t>
             </a:r>
             <a:endParaRPr lang="en-US"/>
@@ -780,35 +778,35 @@
           <a:p>
             <a:pPr lvl="0"/>
             <a:r>
-              <a:rPr lang="sv-SE" smtClean="0"/>
+              <a:rPr lang="sv-SE"/>
               <a:t>Click to edit Master text styles</a:t>
             </a:r>
           </a:p>
           <a:p>
             <a:pPr lvl="1"/>
             <a:r>
-              <a:rPr lang="sv-SE" smtClean="0"/>
+              <a:rPr lang="sv-SE"/>
               <a:t>Second level</a:t>
             </a:r>
           </a:p>
           <a:p>
             <a:pPr lvl="2"/>
             <a:r>
-              <a:rPr lang="sv-SE" smtClean="0"/>
+              <a:rPr lang="sv-SE"/>
               <a:t>Third level</a:t>
             </a:r>
           </a:p>
           <a:p>
             <a:pPr lvl="3"/>
             <a:r>
-              <a:rPr lang="sv-SE" smtClean="0"/>
+              <a:rPr lang="sv-SE"/>
               <a:t>Fourth level</a:t>
             </a:r>
           </a:p>
           <a:p>
             <a:pPr lvl="4"/>
             <a:r>
-              <a:rPr lang="sv-SE" smtClean="0"/>
+              <a:rPr lang="sv-SE"/>
               <a:t>Fifth level</a:t>
             </a:r>
             <a:endParaRPr lang="en-US"/>
@@ -832,7 +830,7 @@
           <a:p>
             <a:fld id="{004859A0-F9C5-444E-AFA2-7F6F6B24A885}" type="datetimeFigureOut">
               <a:rPr lang="en-US" smtClean="0"/>
-              <a:t>9/10/19</a:t>
+              <a:t>10/15/20</a:t>
             </a:fld>
             <a:endParaRPr lang="en-US"/>
           </a:p>
@@ -935,7 +933,7 @@
           </a:lstStyle>
           <a:p>
             <a:r>
-              <a:rPr lang="sv-SE" smtClean="0"/>
+              <a:rPr lang="sv-SE"/>
               <a:t>Click to edit Master title style</a:t>
             </a:r>
             <a:endParaRPr lang="en-US"/>
@@ -1055,7 +1053,7 @@
           <a:p>
             <a:pPr lvl="0"/>
             <a:r>
-              <a:rPr lang="sv-SE" smtClean="0"/>
+              <a:rPr lang="sv-SE"/>
               <a:t>Click to edit Master text styles</a:t>
             </a:r>
           </a:p>
@@ -1078,7 +1076,7 @@
           <a:p>
             <a:fld id="{004859A0-F9C5-444E-AFA2-7F6F6B24A885}" type="datetimeFigureOut">
               <a:rPr lang="en-US" smtClean="0"/>
-              <a:t>9/10/19</a:t>
+              <a:t>10/15/20</a:t>
             </a:fld>
             <a:endParaRPr lang="en-US"/>
           </a:p>
@@ -1172,7 +1170,7 @@
           <a:lstStyle/>
           <a:p>
             <a:r>
-              <a:rPr lang="sv-SE" smtClean="0"/>
+              <a:rPr lang="sv-SE"/>
               <a:t>Click to edit Master title style</a:t>
             </a:r>
             <a:endParaRPr lang="en-US"/>
@@ -1229,35 +1227,35 @@
           <a:p>
             <a:pPr lvl="0"/>
             <a:r>
-              <a:rPr lang="sv-SE" smtClean="0"/>
+              <a:rPr lang="sv-SE"/>
               <a:t>Click to edit Master text styles</a:t>
             </a:r>
           </a:p>
           <a:p>
             <a:pPr lvl="1"/>
             <a:r>
-              <a:rPr lang="sv-SE" smtClean="0"/>
+              <a:rPr lang="sv-SE"/>
               <a:t>Second level</a:t>
             </a:r>
           </a:p>
           <a:p>
             <a:pPr lvl="2"/>
             <a:r>
-              <a:rPr lang="sv-SE" smtClean="0"/>
+              <a:rPr lang="sv-SE"/>
               <a:t>Third level</a:t>
             </a:r>
           </a:p>
           <a:p>
             <a:pPr lvl="3"/>
             <a:r>
-              <a:rPr lang="sv-SE" smtClean="0"/>
+              <a:rPr lang="sv-SE"/>
               <a:t>Fourth level</a:t>
             </a:r>
           </a:p>
           <a:p>
             <a:pPr lvl="4"/>
             <a:r>
-              <a:rPr lang="sv-SE" smtClean="0"/>
+              <a:rPr lang="sv-SE"/>
               <a:t>Fifth level</a:t>
             </a:r>
             <a:endParaRPr lang="en-US"/>
@@ -1314,35 +1312,35 @@
           <a:p>
             <a:pPr lvl="0"/>
             <a:r>
-              <a:rPr lang="sv-SE" smtClean="0"/>
+              <a:rPr lang="sv-SE"/>
               <a:t>Click to edit Master text styles</a:t>
             </a:r>
           </a:p>
           <a:p>
             <a:pPr lvl="1"/>
             <a:r>
-              <a:rPr lang="sv-SE" smtClean="0"/>
+              <a:rPr lang="sv-SE"/>
               <a:t>Second level</a:t>
             </a:r>
           </a:p>
           <a:p>
             <a:pPr lvl="2"/>
             <a:r>
-              <a:rPr lang="sv-SE" smtClean="0"/>
+              <a:rPr lang="sv-SE"/>
               <a:t>Third level</a:t>
             </a:r>
           </a:p>
           <a:p>
             <a:pPr lvl="3"/>
             <a:r>
-              <a:rPr lang="sv-SE" smtClean="0"/>
+              <a:rPr lang="sv-SE"/>
               <a:t>Fourth level</a:t>
             </a:r>
           </a:p>
           <a:p>
             <a:pPr lvl="4"/>
             <a:r>
-              <a:rPr lang="sv-SE" smtClean="0"/>
+              <a:rPr lang="sv-SE"/>
               <a:t>Fifth level</a:t>
             </a:r>
             <a:endParaRPr lang="en-US"/>
@@ -1366,7 +1364,7 @@
           <a:p>
             <a:fld id="{004859A0-F9C5-444E-AFA2-7F6F6B24A885}" type="datetimeFigureOut">
               <a:rPr lang="en-US" smtClean="0"/>
-              <a:t>9/10/19</a:t>
+              <a:t>10/15/20</a:t>
             </a:fld>
             <a:endParaRPr lang="en-US"/>
           </a:p>
@@ -1464,7 +1462,7 @@
           </a:lstStyle>
           <a:p>
             <a:r>
-              <a:rPr lang="sv-SE" smtClean="0"/>
+              <a:rPr lang="sv-SE"/>
               <a:t>Click to edit Master title style</a:t>
             </a:r>
             <a:endParaRPr lang="en-US"/>
@@ -1530,7 +1528,7 @@
           <a:p>
             <a:pPr lvl="0"/>
             <a:r>
-              <a:rPr lang="sv-SE" smtClean="0"/>
+              <a:rPr lang="sv-SE"/>
               <a:t>Click to edit Master text styles</a:t>
             </a:r>
           </a:p>
@@ -1586,35 +1584,35 @@
           <a:p>
             <a:pPr lvl="0"/>
             <a:r>
-              <a:rPr lang="sv-SE" smtClean="0"/>
+              <a:rPr lang="sv-SE"/>
               <a:t>Click to edit Master text styles</a:t>
             </a:r>
           </a:p>
           <a:p>
             <a:pPr lvl="1"/>
             <a:r>
-              <a:rPr lang="sv-SE" smtClean="0"/>
+              <a:rPr lang="sv-SE"/>
               <a:t>Second level</a:t>
             </a:r>
           </a:p>
           <a:p>
             <a:pPr lvl="2"/>
             <a:r>
-              <a:rPr lang="sv-SE" smtClean="0"/>
+              <a:rPr lang="sv-SE"/>
               <a:t>Third level</a:t>
             </a:r>
           </a:p>
           <a:p>
             <a:pPr lvl="3"/>
             <a:r>
-              <a:rPr lang="sv-SE" smtClean="0"/>
+              <a:rPr lang="sv-SE"/>
               <a:t>Fourth level</a:t>
             </a:r>
           </a:p>
           <a:p>
             <a:pPr lvl="4"/>
             <a:r>
-              <a:rPr lang="sv-SE" smtClean="0"/>
+              <a:rPr lang="sv-SE"/>
               <a:t>Fifth level</a:t>
             </a:r>
             <a:endParaRPr lang="en-US"/>
@@ -1680,7 +1678,7 @@
           <a:p>
             <a:pPr lvl="0"/>
             <a:r>
-              <a:rPr lang="sv-SE" smtClean="0"/>
+              <a:rPr lang="sv-SE"/>
               <a:t>Click to edit Master text styles</a:t>
             </a:r>
           </a:p>
@@ -1736,35 +1734,35 @@
           <a:p>
             <a:pPr lvl="0"/>
             <a:r>
-              <a:rPr lang="sv-SE" smtClean="0"/>
+              <a:rPr lang="sv-SE"/>
               <a:t>Click to edit Master text styles</a:t>
             </a:r>
           </a:p>
           <a:p>
             <a:pPr lvl="1"/>
             <a:r>
-              <a:rPr lang="sv-SE" smtClean="0"/>
+              <a:rPr lang="sv-SE"/>
               <a:t>Second level</a:t>
             </a:r>
           </a:p>
           <a:p>
             <a:pPr lvl="2"/>
             <a:r>
-              <a:rPr lang="sv-SE" smtClean="0"/>
+              <a:rPr lang="sv-SE"/>
               <a:t>Third level</a:t>
             </a:r>
           </a:p>
           <a:p>
             <a:pPr lvl="3"/>
             <a:r>
-              <a:rPr lang="sv-SE" smtClean="0"/>
+              <a:rPr lang="sv-SE"/>
               <a:t>Fourth level</a:t>
             </a:r>
           </a:p>
           <a:p>
             <a:pPr lvl="4"/>
             <a:r>
-              <a:rPr lang="sv-SE" smtClean="0"/>
+              <a:rPr lang="sv-SE"/>
               <a:t>Fifth level</a:t>
             </a:r>
             <a:endParaRPr lang="en-US"/>
@@ -1788,7 +1786,7 @@
           <a:p>
             <a:fld id="{004859A0-F9C5-444E-AFA2-7F6F6B24A885}" type="datetimeFigureOut">
               <a:rPr lang="en-US" smtClean="0"/>
-              <a:t>9/10/19</a:t>
+              <a:t>10/15/20</a:t>
             </a:fld>
             <a:endParaRPr lang="en-US"/>
           </a:p>
@@ -1882,7 +1880,7 @@
           <a:lstStyle/>
           <a:p>
             <a:r>
-              <a:rPr lang="sv-SE" smtClean="0"/>
+              <a:rPr lang="sv-SE"/>
               <a:t>Click to edit Master title style</a:t>
             </a:r>
             <a:endParaRPr lang="en-US"/>
@@ -1906,7 +1904,7 @@
           <a:p>
             <a:fld id="{004859A0-F9C5-444E-AFA2-7F6F6B24A885}" type="datetimeFigureOut">
               <a:rPr lang="en-US" smtClean="0"/>
-              <a:t>9/10/19</a:t>
+              <a:t>10/15/20</a:t>
             </a:fld>
             <a:endParaRPr lang="en-US"/>
           </a:p>
@@ -2001,7 +1999,7 @@
           <a:p>
             <a:fld id="{004859A0-F9C5-444E-AFA2-7F6F6B24A885}" type="datetimeFigureOut">
               <a:rPr lang="en-US" smtClean="0"/>
-              <a:t>9/10/19</a:t>
+              <a:t>10/15/20</a:t>
             </a:fld>
             <a:endParaRPr lang="en-US"/>
           </a:p>
@@ -2104,7 +2102,7 @@
           </a:lstStyle>
           <a:p>
             <a:r>
-              <a:rPr lang="sv-SE" smtClean="0"/>
+              <a:rPr lang="sv-SE"/>
               <a:t>Click to edit Master title style</a:t>
             </a:r>
             <a:endParaRPr lang="en-US"/>
@@ -2161,35 +2159,35 @@
           <a:p>
             <a:pPr lvl="0"/>
             <a:r>
-              <a:rPr lang="sv-SE" smtClean="0"/>
+              <a:rPr lang="sv-SE"/>
               <a:t>Click to edit Master text styles</a:t>
             </a:r>
           </a:p>
           <a:p>
             <a:pPr lvl="1"/>
             <a:r>
-              <a:rPr lang="sv-SE" smtClean="0"/>
+              <a:rPr lang="sv-SE"/>
               <a:t>Second level</a:t>
             </a:r>
           </a:p>
           <a:p>
             <a:pPr lvl="2"/>
             <a:r>
-              <a:rPr lang="sv-SE" smtClean="0"/>
+              <a:rPr lang="sv-SE"/>
               <a:t>Third level</a:t>
             </a:r>
           </a:p>
           <a:p>
             <a:pPr lvl="3"/>
             <a:r>
-              <a:rPr lang="sv-SE" smtClean="0"/>
+              <a:rPr lang="sv-SE"/>
               <a:t>Fourth level</a:t>
             </a:r>
           </a:p>
           <a:p>
             <a:pPr lvl="4"/>
             <a:r>
-              <a:rPr lang="sv-SE" smtClean="0"/>
+              <a:rPr lang="sv-SE"/>
               <a:t>Fifth level</a:t>
             </a:r>
             <a:endParaRPr lang="en-US"/>
@@ -2255,7 +2253,7 @@
           <a:p>
             <a:pPr lvl="0"/>
             <a:r>
-              <a:rPr lang="sv-SE" smtClean="0"/>
+              <a:rPr lang="sv-SE"/>
               <a:t>Click to edit Master text styles</a:t>
             </a:r>
           </a:p>
@@ -2278,7 +2276,7 @@
           <a:p>
             <a:fld id="{004859A0-F9C5-444E-AFA2-7F6F6B24A885}" type="datetimeFigureOut">
               <a:rPr lang="en-US" smtClean="0"/>
-              <a:t>9/10/19</a:t>
+              <a:t>10/15/20</a:t>
             </a:fld>
             <a:endParaRPr lang="en-US"/>
           </a:p>
@@ -2381,7 +2379,7 @@
           </a:lstStyle>
           <a:p>
             <a:r>
-              <a:rPr lang="sv-SE" smtClean="0"/>
+              <a:rPr lang="sv-SE"/>
               <a:t>Click to edit Master title style</a:t>
             </a:r>
             <a:endParaRPr lang="en-US"/>
@@ -2508,7 +2506,7 @@
           <a:p>
             <a:pPr lvl="0"/>
             <a:r>
-              <a:rPr lang="sv-SE" smtClean="0"/>
+              <a:rPr lang="sv-SE"/>
               <a:t>Click to edit Master text styles</a:t>
             </a:r>
           </a:p>
@@ -2531,7 +2529,7 @@
           <a:p>
             <a:fld id="{004859A0-F9C5-444E-AFA2-7F6F6B24A885}" type="datetimeFigureOut">
               <a:rPr lang="en-US" smtClean="0"/>
-              <a:t>9/10/19</a:t>
+              <a:t>10/15/20</a:t>
             </a:fld>
             <a:endParaRPr lang="en-US"/>
           </a:p>
@@ -2640,7 +2638,7 @@
           <a:lstStyle/>
           <a:p>
             <a:r>
-              <a:rPr lang="sv-SE" smtClean="0"/>
+              <a:rPr lang="sv-SE"/>
               <a:t>Click to edit Master title style</a:t>
             </a:r>
             <a:endParaRPr lang="en-US"/>
@@ -2674,35 +2672,35 @@
           <a:p>
             <a:pPr lvl="0"/>
             <a:r>
-              <a:rPr lang="sv-SE" smtClean="0"/>
+              <a:rPr lang="sv-SE"/>
               <a:t>Click to edit Master text styles</a:t>
             </a:r>
           </a:p>
           <a:p>
             <a:pPr lvl="1"/>
             <a:r>
-              <a:rPr lang="sv-SE" smtClean="0"/>
+              <a:rPr lang="sv-SE"/>
               <a:t>Second level</a:t>
             </a:r>
           </a:p>
           <a:p>
             <a:pPr lvl="2"/>
             <a:r>
-              <a:rPr lang="sv-SE" smtClean="0"/>
+              <a:rPr lang="sv-SE"/>
               <a:t>Third level</a:t>
             </a:r>
           </a:p>
           <a:p>
             <a:pPr lvl="3"/>
             <a:r>
-              <a:rPr lang="sv-SE" smtClean="0"/>
+              <a:rPr lang="sv-SE"/>
               <a:t>Fourth level</a:t>
             </a:r>
           </a:p>
           <a:p>
             <a:pPr lvl="4"/>
             <a:r>
-              <a:rPr lang="sv-SE" smtClean="0"/>
+              <a:rPr lang="sv-SE"/>
               <a:t>Fifth level</a:t>
             </a:r>
             <a:endParaRPr lang="en-US"/>
@@ -2744,7 +2742,7 @@
           <a:p>
             <a:fld id="{004859A0-F9C5-444E-AFA2-7F6F6B24A885}" type="datetimeFigureOut">
               <a:rPr lang="en-US" smtClean="0"/>
-              <a:t>9/10/19</a:t>
+              <a:t>10/15/20</a:t>
             </a:fld>
             <a:endParaRPr lang="en-US"/>
           </a:p>
@@ -3135,10 +3133,9 @@
           <a:lstStyle/>
           <a:p>
             <a:r>
-              <a:rPr lang="en-US" dirty="0" smtClean="0"/>
+              <a:rPr lang="en-US" dirty="0"/>
               <a:t>NGS workflow</a:t>
             </a:r>
-            <a:endParaRPr lang="en-US" dirty="0"/>
           </a:p>
         </p:txBody>
       </p:sp>
@@ -3158,10 +3155,9 @@
           <a:lstStyle/>
           <a:p>
             <a:r>
-              <a:rPr lang="en-US" dirty="0" smtClean="0"/>
+              <a:rPr lang="en-US" dirty="0"/>
               <a:t>Lab discussion</a:t>
             </a:r>
-            <a:endParaRPr lang="en-US" dirty="0"/>
           </a:p>
         </p:txBody>
       </p:sp>
@@ -3207,1335 +3203,6 @@
         </p:nvSpPr>
         <p:spPr>
           <a:xfrm>
-            <a:off x="457200" y="462"/>
-            <a:ext cx="8229600" cy="1143000"/>
-          </a:xfrm>
-        </p:spPr>
-        <p:txBody>
-          <a:bodyPr/>
-          <a:lstStyle/>
-          <a:p>
-            <a:r>
-              <a:rPr lang="en-US" dirty="0" err="1" smtClean="0"/>
-              <a:t>Annovar</a:t>
-            </a:r>
-            <a:r>
-              <a:rPr lang="en-US" dirty="0" smtClean="0"/>
-              <a:t> and gene information</a:t>
-            </a:r>
-            <a:endParaRPr lang="en-US" dirty="0"/>
-          </a:p>
-        </p:txBody>
-      </p:sp>
-      <p:graphicFrame>
-        <p:nvGraphicFramePr>
-          <p:cNvPr id="4" name="Content Placeholder 3"/>
-          <p:cNvGraphicFramePr>
-            <a:graphicFrameLocks noGrp="1"/>
-          </p:cNvGraphicFramePr>
-          <p:nvPr>
-            <p:ph idx="1"/>
-            <p:extLst>
-              <p:ext uri="{D42A27DB-BD31-4B8C-83A1-F6EECF244321}">
-                <p14:modId xmlns:p14="http://schemas.microsoft.com/office/powerpoint/2010/main" val="302094115"/>
-              </p:ext>
-            </p:extLst>
-          </p:nvPr>
-        </p:nvGraphicFramePr>
-        <p:xfrm>
-          <a:off x="210984" y="1077489"/>
-          <a:ext cx="8769413" cy="1097280"/>
-        </p:xfrm>
-        <a:graphic>
-          <a:graphicData uri="http://schemas.openxmlformats.org/drawingml/2006/table">
-            <a:tbl>
-              <a:tblPr firstRow="1" bandRow="1">
-                <a:tableStyleId>{5C22544A-7EE6-4342-B048-85BDC9FD1C3A}</a:tableStyleId>
-              </a:tblPr>
-              <a:tblGrid>
-                <a:gridCol w="387820"/>
-                <a:gridCol w="873183"/>
-                <a:gridCol w="938032"/>
-                <a:gridCol w="303056"/>
-                <a:gridCol w="360781"/>
-                <a:gridCol w="717399"/>
-                <a:gridCol w="632649"/>
-                <a:gridCol w="336488"/>
-                <a:gridCol w="421266"/>
-                <a:gridCol w="382968"/>
-                <a:gridCol w="868061"/>
-                <a:gridCol w="840662"/>
-                <a:gridCol w="808150"/>
-                <a:gridCol w="898898"/>
-              </a:tblGrid>
-              <a:tr h="370840">
-                <a:tc>
-                  <a:txBody>
-                    <a:bodyPr/>
-                    <a:lstStyle/>
-                    <a:p>
-                      <a:pPr marL="0" marR="0" indent="0" algn="l" defTabSz="457200" rtl="0" eaLnBrk="1" fontAlgn="auto" latinLnBrk="0" hangingPunct="1">
-                        <a:lnSpc>
-                          <a:spcPct val="100000"/>
-                        </a:lnSpc>
-                        <a:spcBef>
-                          <a:spcPts val="0"/>
-                        </a:spcBef>
-                        <a:spcAft>
-                          <a:spcPts val="0"/>
-                        </a:spcAft>
-                        <a:buClrTx/>
-                        <a:buSzTx/>
-                        <a:buFontTx/>
-                        <a:buNone/>
-                        <a:tabLst/>
-                        <a:defRPr/>
-                      </a:pPr>
-                      <a:r>
-                        <a:rPr lang="en-US" sz="1200" dirty="0" err="1" smtClean="0"/>
-                        <a:t>Chr</a:t>
-                      </a:r>
-                      <a:endParaRPr lang="en-US" sz="1200" dirty="0"/>
-                    </a:p>
-                  </a:txBody>
-                  <a:tcPr/>
-                </a:tc>
-                <a:tc>
-                  <a:txBody>
-                    <a:bodyPr/>
-                    <a:lstStyle/>
-                    <a:p>
-                      <a:r>
-                        <a:rPr lang="en-US" sz="1200" dirty="0" smtClean="0"/>
-                        <a:t>Start</a:t>
-                      </a:r>
-                      <a:endParaRPr lang="en-US" sz="1200" dirty="0"/>
-                    </a:p>
-                  </a:txBody>
-                  <a:tcPr/>
-                </a:tc>
-                <a:tc>
-                  <a:txBody>
-                    <a:bodyPr/>
-                    <a:lstStyle/>
-                    <a:p>
-                      <a:r>
-                        <a:rPr lang="en-US" sz="1200" dirty="0" smtClean="0"/>
-                        <a:t>End</a:t>
-                      </a:r>
-                      <a:endParaRPr lang="en-US" sz="1200" dirty="0"/>
-                    </a:p>
-                  </a:txBody>
-                  <a:tcPr/>
-                </a:tc>
-                <a:tc>
-                  <a:txBody>
-                    <a:bodyPr/>
-                    <a:lstStyle/>
-                    <a:p>
-                      <a:r>
-                        <a:rPr lang="en-US" sz="1200" dirty="0" smtClean="0"/>
-                        <a:t>Ref</a:t>
-                      </a:r>
-                      <a:endParaRPr lang="en-US" sz="1200" dirty="0"/>
-                    </a:p>
-                  </a:txBody>
-                  <a:tcPr/>
-                </a:tc>
-                <a:tc>
-                  <a:txBody>
-                    <a:bodyPr/>
-                    <a:lstStyle/>
-                    <a:p>
-                      <a:r>
-                        <a:rPr lang="en-US" sz="1200" dirty="0" smtClean="0"/>
-                        <a:t>Alt</a:t>
-                      </a:r>
-                      <a:endParaRPr lang="en-US" sz="1200" dirty="0"/>
-                    </a:p>
-                  </a:txBody>
-                  <a:tcPr/>
-                </a:tc>
-                <a:tc>
-                  <a:txBody>
-                    <a:bodyPr/>
-                    <a:lstStyle/>
-                    <a:p>
-                      <a:r>
-                        <a:rPr lang="en-US" sz="1200" dirty="0" err="1" smtClean="0"/>
-                        <a:t>Func</a:t>
-                      </a:r>
-                      <a:endParaRPr lang="en-US" sz="1200" dirty="0"/>
-                    </a:p>
-                  </a:txBody>
-                  <a:tcPr/>
-                </a:tc>
-                <a:tc>
-                  <a:txBody>
-                    <a:bodyPr/>
-                    <a:lstStyle/>
-                    <a:p>
-                      <a:r>
-                        <a:rPr lang="en-US" sz="1200" dirty="0" smtClean="0"/>
-                        <a:t>Gene</a:t>
-                      </a:r>
-                      <a:endParaRPr lang="en-US" sz="1200" dirty="0"/>
-                    </a:p>
-                  </a:txBody>
-                  <a:tcPr/>
-                </a:tc>
-                <a:tc>
-                  <a:txBody>
-                    <a:bodyPr/>
-                    <a:lstStyle/>
-                    <a:p>
-                      <a:r>
-                        <a:rPr lang="en-US" sz="1000" dirty="0" err="1" smtClean="0"/>
-                        <a:t>GeneD</a:t>
-                      </a:r>
-                      <a:r>
-                        <a:rPr lang="en-US" sz="1000" dirty="0" smtClean="0"/>
-                        <a:t>.</a:t>
-                      </a:r>
-                      <a:endParaRPr lang="en-US" sz="1000" dirty="0"/>
-                    </a:p>
-                  </a:txBody>
-                  <a:tcPr/>
-                </a:tc>
-                <a:tc>
-                  <a:txBody>
-                    <a:bodyPr/>
-                    <a:lstStyle/>
-                    <a:p>
-                      <a:pPr marL="0" marR="0" indent="0" algn="l" defTabSz="457200" rtl="0" eaLnBrk="1" fontAlgn="auto" latinLnBrk="0" hangingPunct="1">
-                        <a:lnSpc>
-                          <a:spcPct val="100000"/>
-                        </a:lnSpc>
-                        <a:spcBef>
-                          <a:spcPts val="0"/>
-                        </a:spcBef>
-                        <a:spcAft>
-                          <a:spcPts val="0"/>
-                        </a:spcAft>
-                        <a:buClrTx/>
-                        <a:buSzTx/>
-                        <a:buFontTx/>
-                        <a:buNone/>
-                        <a:tabLst/>
-                        <a:defRPr/>
-                      </a:pPr>
-                      <a:r>
-                        <a:rPr lang="en-US" sz="1000" dirty="0" err="1" smtClean="0"/>
-                        <a:t>ExonicFunc</a:t>
-                      </a:r>
-                      <a:endParaRPr lang="en-US" sz="1000" dirty="0"/>
-                    </a:p>
-                  </a:txBody>
-                  <a:tcPr/>
-                </a:tc>
-                <a:tc>
-                  <a:txBody>
-                    <a:bodyPr/>
-                    <a:lstStyle/>
-                    <a:p>
-                      <a:r>
-                        <a:rPr lang="en-US" sz="1000" dirty="0" err="1" smtClean="0"/>
-                        <a:t>AAchange</a:t>
-                      </a:r>
-                      <a:endParaRPr lang="en-US" sz="1000" dirty="0"/>
-                    </a:p>
-                  </a:txBody>
-                  <a:tcPr/>
-                </a:tc>
-                <a:tc>
-                  <a:txBody>
-                    <a:bodyPr/>
-                    <a:lstStyle/>
-                    <a:p>
-                      <a:r>
-                        <a:rPr lang="en-US" sz="1200" dirty="0" smtClean="0"/>
-                        <a:t>snp138</a:t>
-                      </a:r>
-                      <a:endParaRPr lang="en-US" sz="1200" dirty="0"/>
-                    </a:p>
-                  </a:txBody>
-                  <a:tcPr/>
-                </a:tc>
-                <a:tc>
-                  <a:txBody>
-                    <a:bodyPr/>
-                    <a:lstStyle/>
-                    <a:p>
-                      <a:r>
-                        <a:rPr lang="en-US" sz="1200" dirty="0" smtClean="0">
-                          <a:solidFill>
-                            <a:schemeClr val="bg1"/>
-                          </a:solidFill>
-                        </a:rPr>
-                        <a:t>1000g2015aug_all</a:t>
-                      </a:r>
-                      <a:endParaRPr lang="en-US" sz="1200" dirty="0">
-                        <a:solidFill>
-                          <a:schemeClr val="bg1"/>
-                        </a:solidFill>
-                      </a:endParaRPr>
-                    </a:p>
-                  </a:txBody>
-                  <a:tcPr/>
-                </a:tc>
-                <a:tc>
-                  <a:txBody>
-                    <a:bodyPr/>
-                    <a:lstStyle/>
-                    <a:p>
-                      <a:r>
-                        <a:rPr lang="en-US" sz="1200" dirty="0" smtClean="0">
-                          <a:solidFill>
-                            <a:schemeClr val="bg1"/>
-                          </a:solidFill>
-                        </a:rPr>
-                        <a:t>1000g2015aug_eur</a:t>
-                      </a:r>
-                      <a:endParaRPr lang="en-US" sz="1200" dirty="0"/>
-                    </a:p>
-                  </a:txBody>
-                  <a:tcPr/>
-                </a:tc>
-                <a:tc>
-                  <a:txBody>
-                    <a:bodyPr/>
-                    <a:lstStyle/>
-                    <a:p>
-                      <a:r>
-                        <a:rPr lang="en-US" sz="1200" dirty="0" smtClean="0"/>
-                        <a:t>100g2015aug_afr</a:t>
-                      </a:r>
-                      <a:endParaRPr lang="en-US" sz="1200" dirty="0"/>
-                    </a:p>
-                  </a:txBody>
-                  <a:tcPr/>
-                </a:tc>
-              </a:tr>
-              <a:tr h="370840">
-                <a:tc>
-                  <a:txBody>
-                    <a:bodyPr/>
-                    <a:lstStyle/>
-                    <a:p>
-                      <a:r>
-                        <a:rPr lang="en-US" sz="1200" dirty="0" smtClean="0"/>
-                        <a:t>2</a:t>
-                      </a:r>
-                      <a:endParaRPr lang="en-US" sz="1200" dirty="0"/>
-                    </a:p>
-                  </a:txBody>
-                  <a:tcPr/>
-                </a:tc>
-                <a:tc>
-                  <a:txBody>
-                    <a:bodyPr/>
-                    <a:lstStyle/>
-                    <a:p>
-                      <a:r>
-                        <a:rPr lang="en-US" sz="1200" dirty="0" smtClean="0"/>
-                        <a:t>136608646</a:t>
-                      </a:r>
-                      <a:endParaRPr lang="en-US" sz="1200" dirty="0"/>
-                    </a:p>
-                  </a:txBody>
-                  <a:tcPr/>
-                </a:tc>
-                <a:tc>
-                  <a:txBody>
-                    <a:bodyPr/>
-                    <a:lstStyle/>
-                    <a:p>
-                      <a:pPr marL="0" marR="0" indent="0" algn="l" defTabSz="457200" rtl="0" eaLnBrk="1" fontAlgn="auto" latinLnBrk="0" hangingPunct="1">
-                        <a:lnSpc>
-                          <a:spcPct val="100000"/>
-                        </a:lnSpc>
-                        <a:spcBef>
-                          <a:spcPts val="0"/>
-                        </a:spcBef>
-                        <a:spcAft>
-                          <a:spcPts val="0"/>
-                        </a:spcAft>
-                        <a:buClrTx/>
-                        <a:buSzTx/>
-                        <a:buFontTx/>
-                        <a:buNone/>
-                        <a:tabLst/>
-                        <a:defRPr/>
-                      </a:pPr>
-                      <a:r>
-                        <a:rPr lang="en-US" sz="1200" dirty="0" smtClean="0"/>
-                        <a:t>136608646</a:t>
-                      </a:r>
-                    </a:p>
-                    <a:p>
-                      <a:endParaRPr lang="en-US" sz="1200" dirty="0"/>
-                    </a:p>
-                  </a:txBody>
-                  <a:tcPr/>
-                </a:tc>
-                <a:tc>
-                  <a:txBody>
-                    <a:bodyPr/>
-                    <a:lstStyle/>
-                    <a:p>
-                      <a:r>
-                        <a:rPr lang="en-US" sz="1200" dirty="0" smtClean="0"/>
-                        <a:t>G</a:t>
-                      </a:r>
-                      <a:endParaRPr lang="en-US" sz="1200" dirty="0"/>
-                    </a:p>
-                  </a:txBody>
-                  <a:tcPr/>
-                </a:tc>
-                <a:tc>
-                  <a:txBody>
-                    <a:bodyPr/>
-                    <a:lstStyle/>
-                    <a:p>
-                      <a:r>
-                        <a:rPr lang="en-US" sz="1200" dirty="0" smtClean="0"/>
-                        <a:t>A</a:t>
-                      </a:r>
-                      <a:endParaRPr lang="en-US" sz="1200" dirty="0"/>
-                    </a:p>
-                  </a:txBody>
-                  <a:tcPr/>
-                </a:tc>
-                <a:tc>
-                  <a:txBody>
-                    <a:bodyPr/>
-                    <a:lstStyle/>
-                    <a:p>
-                      <a:r>
-                        <a:rPr lang="en-US" sz="1200" dirty="0" err="1" smtClean="0"/>
-                        <a:t>intronic</a:t>
-                      </a:r>
-                      <a:endParaRPr lang="en-US" sz="1200" dirty="0"/>
-                    </a:p>
-                  </a:txBody>
-                  <a:tcPr/>
-                </a:tc>
-                <a:tc>
-                  <a:txBody>
-                    <a:bodyPr/>
-                    <a:lstStyle/>
-                    <a:p>
-                      <a:r>
-                        <a:rPr lang="en-US" sz="1200" dirty="0" smtClean="0"/>
-                        <a:t>MCM6</a:t>
-                      </a:r>
-                      <a:endParaRPr lang="en-US" sz="1200" dirty="0"/>
-                    </a:p>
-                  </a:txBody>
-                  <a:tcPr/>
-                </a:tc>
-                <a:tc>
-                  <a:txBody>
-                    <a:bodyPr/>
-                    <a:lstStyle/>
-                    <a:p>
-                      <a:endParaRPr lang="en-US" sz="1200" dirty="0"/>
-                    </a:p>
-                  </a:txBody>
-                  <a:tcPr/>
-                </a:tc>
-                <a:tc>
-                  <a:txBody>
-                    <a:bodyPr/>
-                    <a:lstStyle/>
-                    <a:p>
-                      <a:endParaRPr lang="en-US" sz="1200" dirty="0"/>
-                    </a:p>
-                  </a:txBody>
-                  <a:tcPr/>
-                </a:tc>
-                <a:tc>
-                  <a:txBody>
-                    <a:bodyPr/>
-                    <a:lstStyle/>
-                    <a:p>
-                      <a:endParaRPr lang="en-US" sz="1200" dirty="0"/>
-                    </a:p>
-                  </a:txBody>
-                  <a:tcPr/>
-                </a:tc>
-                <a:tc>
-                  <a:txBody>
-                    <a:bodyPr/>
-                    <a:lstStyle/>
-                    <a:p>
-                      <a:pPr marL="0" marR="0" indent="0" algn="l" defTabSz="457200" rtl="0" eaLnBrk="1" fontAlgn="auto" latinLnBrk="0" hangingPunct="1">
-                        <a:lnSpc>
-                          <a:spcPct val="100000"/>
-                        </a:lnSpc>
-                        <a:spcBef>
-                          <a:spcPts val="0"/>
-                        </a:spcBef>
-                        <a:spcAft>
-                          <a:spcPts val="0"/>
-                        </a:spcAft>
-                        <a:buClrTx/>
-                        <a:buSzTx/>
-                        <a:buFontTx/>
-                        <a:buNone/>
-                        <a:tabLst/>
-                        <a:defRPr/>
-                      </a:pPr>
-                      <a:r>
-                        <a:rPr lang="en-US" sz="1200" dirty="0" smtClean="0"/>
-                        <a:t>rs4988235</a:t>
-                      </a:r>
-                    </a:p>
-                    <a:p>
-                      <a:endParaRPr lang="en-US" sz="1200" dirty="0"/>
-                    </a:p>
-                  </a:txBody>
-                  <a:tcPr/>
-                </a:tc>
-                <a:tc>
-                  <a:txBody>
-                    <a:bodyPr/>
-                    <a:lstStyle/>
-                    <a:p>
-                      <a:endParaRPr lang="en-US" dirty="0"/>
-                    </a:p>
-                  </a:txBody>
-                  <a:tcPr/>
-                </a:tc>
-                <a:tc>
-                  <a:txBody>
-                    <a:bodyPr/>
-                    <a:lstStyle/>
-                    <a:p>
-                      <a:endParaRPr lang="en-US"/>
-                    </a:p>
-                  </a:txBody>
-                  <a:tcPr/>
-                </a:tc>
-                <a:tc>
-                  <a:txBody>
-                    <a:bodyPr/>
-                    <a:lstStyle/>
-                    <a:p>
-                      <a:endParaRPr lang="en-US" dirty="0"/>
-                    </a:p>
-                  </a:txBody>
-                  <a:tcPr/>
-                </a:tc>
-              </a:tr>
-            </a:tbl>
-          </a:graphicData>
-        </a:graphic>
-      </p:graphicFrame>
-      <p:sp>
-        <p:nvSpPr>
-          <p:cNvPr id="7" name="TextBox 6"/>
-          <p:cNvSpPr txBox="1"/>
-          <p:nvPr/>
-        </p:nvSpPr>
-        <p:spPr>
-          <a:xfrm>
-            <a:off x="210984" y="2652458"/>
-            <a:ext cx="8933016" cy="1477328"/>
-          </a:xfrm>
-          <a:prstGeom prst="rect">
-            <a:avLst/>
-          </a:prstGeom>
-          <a:noFill/>
-        </p:spPr>
-        <p:txBody>
-          <a:bodyPr wrap="square" rtlCol="0">
-            <a:spAutoFit/>
-          </a:bodyPr>
-          <a:lstStyle/>
-          <a:p>
-            <a:r>
-              <a:rPr lang="en-US" dirty="0" smtClean="0"/>
-              <a:t>The variant site is within an intron of MCM6, </a:t>
-            </a:r>
-          </a:p>
-          <a:p>
-            <a:r>
-              <a:rPr lang="en-US" dirty="0"/>
-              <a:t>	</a:t>
-            </a:r>
-            <a:r>
-              <a:rPr lang="en-US" dirty="0" smtClean="0"/>
-              <a:t>but acts as an enhancer of the neighboring gene LCT (according to </a:t>
-            </a:r>
-            <a:r>
-              <a:rPr lang="en-US" dirty="0" err="1" smtClean="0"/>
-              <a:t>Mattar</a:t>
-            </a:r>
-            <a:r>
-              <a:rPr lang="en-US" dirty="0" smtClean="0"/>
-              <a:t>, et. al., 2012)</a:t>
-            </a:r>
-          </a:p>
-          <a:p>
-            <a:endParaRPr lang="en-US" dirty="0"/>
-          </a:p>
-          <a:p>
-            <a:r>
-              <a:rPr lang="en-US" dirty="0" smtClean="0"/>
-              <a:t>It is common to look for variants in exons first, there are 7 </a:t>
-            </a:r>
-            <a:r>
-              <a:rPr lang="en-US" dirty="0" err="1" smtClean="0"/>
-              <a:t>exonic</a:t>
-            </a:r>
-            <a:r>
-              <a:rPr lang="en-US" dirty="0" smtClean="0"/>
-              <a:t> variants in LCT in these samples: “cat my_annovar.hg19_multianno.txt | </a:t>
-            </a:r>
-            <a:r>
-              <a:rPr lang="en-US" dirty="0" err="1" smtClean="0"/>
-              <a:t>grep</a:t>
-            </a:r>
-            <a:r>
-              <a:rPr lang="en-US" dirty="0" smtClean="0"/>
-              <a:t> LCT | </a:t>
-            </a:r>
-            <a:r>
-              <a:rPr lang="en-US" dirty="0" err="1" smtClean="0"/>
-              <a:t>grep</a:t>
-            </a:r>
-            <a:r>
-              <a:rPr lang="en-US" dirty="0" smtClean="0"/>
-              <a:t> </a:t>
-            </a:r>
-            <a:r>
-              <a:rPr lang="en-US" dirty="0" err="1" smtClean="0"/>
-              <a:t>exonic</a:t>
-            </a:r>
-            <a:r>
-              <a:rPr lang="en-US" dirty="0" smtClean="0"/>
-              <a:t>”</a:t>
-            </a:r>
-            <a:endParaRPr lang="en-US" dirty="0"/>
-          </a:p>
-        </p:txBody>
-      </p:sp>
-    </p:spTree>
-    <p:extLst>
-      <p:ext uri="{BB962C8B-B14F-4D97-AF65-F5344CB8AC3E}">
-        <p14:creationId xmlns:p14="http://schemas.microsoft.com/office/powerpoint/2010/main" val="1443130743"/>
-      </p:ext>
-    </p:extLst>
-  </p:cSld>
-  <p:clrMapOvr>
-    <a:masterClrMapping/>
-  </p:clrMapOvr>
-</p:sld>
-</file>
-
-<file path=ppt/slides/slide3.xml><?xml version="1.0" encoding="utf-8"?>
-<p:sld xmlns:a="http://schemas.openxmlformats.org/drawingml/2006/main" xmlns:r="http://schemas.openxmlformats.org/officeDocument/2006/relationships" xmlns:p="http://schemas.openxmlformats.org/presentationml/2006/main">
-  <p:cSld>
-    <p:spTree>
-      <p:nvGrpSpPr>
-        <p:cNvPr id="1" name=""/>
-        <p:cNvGrpSpPr/>
-        <p:nvPr/>
-      </p:nvGrpSpPr>
-      <p:grpSpPr>
-        <a:xfrm>
-          <a:off x="0" y="0"/>
-          <a:ext cx="0" cy="0"/>
-          <a:chOff x="0" y="0"/>
-          <a:chExt cx="0" cy="0"/>
-        </a:xfrm>
-      </p:grpSpPr>
-      <p:sp>
-        <p:nvSpPr>
-          <p:cNvPr id="2" name="Title 1"/>
-          <p:cNvSpPr>
-            <a:spLocks noGrp="1"/>
-          </p:cNvSpPr>
-          <p:nvPr>
-            <p:ph type="title"/>
-          </p:nvPr>
-        </p:nvSpPr>
-        <p:spPr>
-          <a:xfrm>
-            <a:off x="457200" y="462"/>
-            <a:ext cx="8229600" cy="1143000"/>
-          </a:xfrm>
-        </p:spPr>
-        <p:txBody>
-          <a:bodyPr/>
-          <a:lstStyle/>
-          <a:p>
-            <a:r>
-              <a:rPr lang="en-US" dirty="0" err="1" smtClean="0"/>
-              <a:t>Annovar</a:t>
-            </a:r>
-            <a:r>
-              <a:rPr lang="en-US" dirty="0" smtClean="0"/>
-              <a:t> and allele frequency</a:t>
-            </a:r>
-            <a:endParaRPr lang="en-US" dirty="0"/>
-          </a:p>
-        </p:txBody>
-      </p:sp>
-      <p:graphicFrame>
-        <p:nvGraphicFramePr>
-          <p:cNvPr id="4" name="Content Placeholder 3"/>
-          <p:cNvGraphicFramePr>
-            <a:graphicFrameLocks noGrp="1"/>
-          </p:cNvGraphicFramePr>
-          <p:nvPr>
-            <p:ph idx="1"/>
-            <p:extLst>
-              <p:ext uri="{D42A27DB-BD31-4B8C-83A1-F6EECF244321}">
-                <p14:modId xmlns:p14="http://schemas.microsoft.com/office/powerpoint/2010/main" val="471911038"/>
-              </p:ext>
-            </p:extLst>
-          </p:nvPr>
-        </p:nvGraphicFramePr>
-        <p:xfrm>
-          <a:off x="210984" y="947005"/>
-          <a:ext cx="8769413" cy="1097280"/>
-        </p:xfrm>
-        <a:graphic>
-          <a:graphicData uri="http://schemas.openxmlformats.org/drawingml/2006/table">
-            <a:tbl>
-              <a:tblPr firstRow="1" bandRow="1">
-                <a:tableStyleId>{5C22544A-7EE6-4342-B048-85BDC9FD1C3A}</a:tableStyleId>
-              </a:tblPr>
-              <a:tblGrid>
-                <a:gridCol w="387820"/>
-                <a:gridCol w="873183"/>
-                <a:gridCol w="938032"/>
-                <a:gridCol w="303056"/>
-                <a:gridCol w="360781"/>
-                <a:gridCol w="717399"/>
-                <a:gridCol w="632649"/>
-                <a:gridCol w="336488"/>
-                <a:gridCol w="421266"/>
-                <a:gridCol w="382968"/>
-                <a:gridCol w="868061"/>
-                <a:gridCol w="840662"/>
-                <a:gridCol w="808150"/>
-                <a:gridCol w="898898"/>
-              </a:tblGrid>
-              <a:tr h="370840">
-                <a:tc>
-                  <a:txBody>
-                    <a:bodyPr/>
-                    <a:lstStyle/>
-                    <a:p>
-                      <a:pPr marL="0" marR="0" indent="0" algn="l" defTabSz="457200" rtl="0" eaLnBrk="1" fontAlgn="auto" latinLnBrk="0" hangingPunct="1">
-                        <a:lnSpc>
-                          <a:spcPct val="100000"/>
-                        </a:lnSpc>
-                        <a:spcBef>
-                          <a:spcPts val="0"/>
-                        </a:spcBef>
-                        <a:spcAft>
-                          <a:spcPts val="0"/>
-                        </a:spcAft>
-                        <a:buClrTx/>
-                        <a:buSzTx/>
-                        <a:buFontTx/>
-                        <a:buNone/>
-                        <a:tabLst/>
-                        <a:defRPr/>
-                      </a:pPr>
-                      <a:r>
-                        <a:rPr lang="en-US" sz="1200" dirty="0" err="1" smtClean="0"/>
-                        <a:t>Chr</a:t>
-                      </a:r>
-                      <a:endParaRPr lang="en-US" sz="1200" dirty="0"/>
-                    </a:p>
-                  </a:txBody>
-                  <a:tcPr/>
-                </a:tc>
-                <a:tc>
-                  <a:txBody>
-                    <a:bodyPr/>
-                    <a:lstStyle/>
-                    <a:p>
-                      <a:r>
-                        <a:rPr lang="en-US" sz="1200" dirty="0" smtClean="0"/>
-                        <a:t>Start</a:t>
-                      </a:r>
-                      <a:endParaRPr lang="en-US" sz="1200" dirty="0"/>
-                    </a:p>
-                  </a:txBody>
-                  <a:tcPr/>
-                </a:tc>
-                <a:tc>
-                  <a:txBody>
-                    <a:bodyPr/>
-                    <a:lstStyle/>
-                    <a:p>
-                      <a:r>
-                        <a:rPr lang="en-US" sz="1200" dirty="0" smtClean="0"/>
-                        <a:t>End</a:t>
-                      </a:r>
-                      <a:endParaRPr lang="en-US" sz="1200" dirty="0"/>
-                    </a:p>
-                  </a:txBody>
-                  <a:tcPr/>
-                </a:tc>
-                <a:tc>
-                  <a:txBody>
-                    <a:bodyPr/>
-                    <a:lstStyle/>
-                    <a:p>
-                      <a:r>
-                        <a:rPr lang="en-US" sz="1200" dirty="0" smtClean="0"/>
-                        <a:t>Ref</a:t>
-                      </a:r>
-                      <a:endParaRPr lang="en-US" sz="1200" dirty="0"/>
-                    </a:p>
-                  </a:txBody>
-                  <a:tcPr/>
-                </a:tc>
-                <a:tc>
-                  <a:txBody>
-                    <a:bodyPr/>
-                    <a:lstStyle/>
-                    <a:p>
-                      <a:r>
-                        <a:rPr lang="en-US" sz="1200" dirty="0" smtClean="0"/>
-                        <a:t>Alt</a:t>
-                      </a:r>
-                      <a:endParaRPr lang="en-US" sz="1200" dirty="0"/>
-                    </a:p>
-                  </a:txBody>
-                  <a:tcPr/>
-                </a:tc>
-                <a:tc>
-                  <a:txBody>
-                    <a:bodyPr/>
-                    <a:lstStyle/>
-                    <a:p>
-                      <a:r>
-                        <a:rPr lang="en-US" sz="1200" dirty="0" err="1" smtClean="0"/>
-                        <a:t>Func</a:t>
-                      </a:r>
-                      <a:endParaRPr lang="en-US" sz="1200" dirty="0"/>
-                    </a:p>
-                  </a:txBody>
-                  <a:tcPr/>
-                </a:tc>
-                <a:tc>
-                  <a:txBody>
-                    <a:bodyPr/>
-                    <a:lstStyle/>
-                    <a:p>
-                      <a:r>
-                        <a:rPr lang="en-US" sz="1200" dirty="0" smtClean="0"/>
-                        <a:t>Gene</a:t>
-                      </a:r>
-                      <a:endParaRPr lang="en-US" sz="1200" dirty="0"/>
-                    </a:p>
-                  </a:txBody>
-                  <a:tcPr/>
-                </a:tc>
-                <a:tc>
-                  <a:txBody>
-                    <a:bodyPr/>
-                    <a:lstStyle/>
-                    <a:p>
-                      <a:r>
-                        <a:rPr lang="en-US" sz="1000" dirty="0" err="1" smtClean="0"/>
-                        <a:t>GeneD</a:t>
-                      </a:r>
-                      <a:r>
-                        <a:rPr lang="en-US" sz="1000" dirty="0" smtClean="0"/>
-                        <a:t>.</a:t>
-                      </a:r>
-                      <a:endParaRPr lang="en-US" sz="1000" dirty="0"/>
-                    </a:p>
-                  </a:txBody>
-                  <a:tcPr/>
-                </a:tc>
-                <a:tc>
-                  <a:txBody>
-                    <a:bodyPr/>
-                    <a:lstStyle/>
-                    <a:p>
-                      <a:pPr marL="0" marR="0" indent="0" algn="l" defTabSz="457200" rtl="0" eaLnBrk="1" fontAlgn="auto" latinLnBrk="0" hangingPunct="1">
-                        <a:lnSpc>
-                          <a:spcPct val="100000"/>
-                        </a:lnSpc>
-                        <a:spcBef>
-                          <a:spcPts val="0"/>
-                        </a:spcBef>
-                        <a:spcAft>
-                          <a:spcPts val="0"/>
-                        </a:spcAft>
-                        <a:buClrTx/>
-                        <a:buSzTx/>
-                        <a:buFontTx/>
-                        <a:buNone/>
-                        <a:tabLst/>
-                        <a:defRPr/>
-                      </a:pPr>
-                      <a:r>
-                        <a:rPr lang="en-US" sz="1000" dirty="0" err="1" smtClean="0"/>
-                        <a:t>ExonicFunc</a:t>
-                      </a:r>
-                      <a:endParaRPr lang="en-US" sz="1000" dirty="0"/>
-                    </a:p>
-                  </a:txBody>
-                  <a:tcPr/>
-                </a:tc>
-                <a:tc>
-                  <a:txBody>
-                    <a:bodyPr/>
-                    <a:lstStyle/>
-                    <a:p>
-                      <a:r>
-                        <a:rPr lang="en-US" sz="1000" dirty="0" err="1" smtClean="0"/>
-                        <a:t>AAchange</a:t>
-                      </a:r>
-                      <a:endParaRPr lang="en-US" sz="1000" dirty="0"/>
-                    </a:p>
-                  </a:txBody>
-                  <a:tcPr/>
-                </a:tc>
-                <a:tc>
-                  <a:txBody>
-                    <a:bodyPr/>
-                    <a:lstStyle/>
-                    <a:p>
-                      <a:r>
-                        <a:rPr lang="en-US" sz="1200" dirty="0" smtClean="0"/>
-                        <a:t>snp138</a:t>
-                      </a:r>
-                      <a:endParaRPr lang="en-US" sz="1200" dirty="0"/>
-                    </a:p>
-                  </a:txBody>
-                  <a:tcPr/>
-                </a:tc>
-                <a:tc>
-                  <a:txBody>
-                    <a:bodyPr/>
-                    <a:lstStyle/>
-                    <a:p>
-                      <a:r>
-                        <a:rPr lang="en-US" sz="1200" dirty="0" smtClean="0">
-                          <a:solidFill>
-                            <a:schemeClr val="bg1"/>
-                          </a:solidFill>
-                        </a:rPr>
-                        <a:t>1000g2015aug_all</a:t>
-                      </a:r>
-                      <a:endParaRPr lang="en-US" sz="1200" dirty="0">
-                        <a:solidFill>
-                          <a:schemeClr val="bg1"/>
-                        </a:solidFill>
-                      </a:endParaRPr>
-                    </a:p>
-                  </a:txBody>
-                  <a:tcPr/>
-                </a:tc>
-                <a:tc>
-                  <a:txBody>
-                    <a:bodyPr/>
-                    <a:lstStyle/>
-                    <a:p>
-                      <a:r>
-                        <a:rPr lang="en-US" sz="1200" dirty="0" smtClean="0">
-                          <a:solidFill>
-                            <a:schemeClr val="bg1"/>
-                          </a:solidFill>
-                        </a:rPr>
-                        <a:t>1000g2015aug_eur</a:t>
-                      </a:r>
-                      <a:endParaRPr lang="en-US" sz="1200" dirty="0"/>
-                    </a:p>
-                  </a:txBody>
-                  <a:tcPr/>
-                </a:tc>
-                <a:tc>
-                  <a:txBody>
-                    <a:bodyPr/>
-                    <a:lstStyle/>
-                    <a:p>
-                      <a:r>
-                        <a:rPr lang="en-US" sz="1200" dirty="0" smtClean="0"/>
-                        <a:t>100g2015aug_afr</a:t>
-                      </a:r>
-                      <a:endParaRPr lang="en-US" sz="1200" dirty="0"/>
-                    </a:p>
-                  </a:txBody>
-                  <a:tcPr/>
-                </a:tc>
-              </a:tr>
-              <a:tr h="370840">
-                <a:tc>
-                  <a:txBody>
-                    <a:bodyPr/>
-                    <a:lstStyle/>
-                    <a:p>
-                      <a:r>
-                        <a:rPr lang="en-US" sz="1200" dirty="0" smtClean="0"/>
-                        <a:t>2</a:t>
-                      </a:r>
-                      <a:endParaRPr lang="en-US" sz="1200" dirty="0"/>
-                    </a:p>
-                  </a:txBody>
-                  <a:tcPr/>
-                </a:tc>
-                <a:tc>
-                  <a:txBody>
-                    <a:bodyPr/>
-                    <a:lstStyle/>
-                    <a:p>
-                      <a:r>
-                        <a:rPr lang="en-US" sz="1200" dirty="0" smtClean="0"/>
-                        <a:t>136608646</a:t>
-                      </a:r>
-                      <a:endParaRPr lang="en-US" sz="1200" dirty="0"/>
-                    </a:p>
-                  </a:txBody>
-                  <a:tcPr/>
-                </a:tc>
-                <a:tc>
-                  <a:txBody>
-                    <a:bodyPr/>
-                    <a:lstStyle/>
-                    <a:p>
-                      <a:pPr marL="0" marR="0" indent="0" algn="l" defTabSz="457200" rtl="0" eaLnBrk="1" fontAlgn="auto" latinLnBrk="0" hangingPunct="1">
-                        <a:lnSpc>
-                          <a:spcPct val="100000"/>
-                        </a:lnSpc>
-                        <a:spcBef>
-                          <a:spcPts val="0"/>
-                        </a:spcBef>
-                        <a:spcAft>
-                          <a:spcPts val="0"/>
-                        </a:spcAft>
-                        <a:buClrTx/>
-                        <a:buSzTx/>
-                        <a:buFontTx/>
-                        <a:buNone/>
-                        <a:tabLst/>
-                        <a:defRPr/>
-                      </a:pPr>
-                      <a:r>
-                        <a:rPr lang="en-US" sz="1200" dirty="0" smtClean="0"/>
-                        <a:t>136608646</a:t>
-                      </a:r>
-                    </a:p>
-                    <a:p>
-                      <a:endParaRPr lang="en-US" sz="1200" dirty="0"/>
-                    </a:p>
-                  </a:txBody>
-                  <a:tcPr/>
-                </a:tc>
-                <a:tc>
-                  <a:txBody>
-                    <a:bodyPr/>
-                    <a:lstStyle/>
-                    <a:p>
-                      <a:r>
-                        <a:rPr lang="en-US" sz="1200" dirty="0" smtClean="0"/>
-                        <a:t>G</a:t>
-                      </a:r>
-                      <a:endParaRPr lang="en-US" sz="1200" dirty="0"/>
-                    </a:p>
-                  </a:txBody>
-                  <a:tcPr/>
-                </a:tc>
-                <a:tc>
-                  <a:txBody>
-                    <a:bodyPr/>
-                    <a:lstStyle/>
-                    <a:p>
-                      <a:r>
-                        <a:rPr lang="en-US" sz="1200" dirty="0" smtClean="0"/>
-                        <a:t>A</a:t>
-                      </a:r>
-                      <a:endParaRPr lang="en-US" sz="1200" dirty="0"/>
-                    </a:p>
-                  </a:txBody>
-                  <a:tcPr/>
-                </a:tc>
-                <a:tc>
-                  <a:txBody>
-                    <a:bodyPr/>
-                    <a:lstStyle/>
-                    <a:p>
-                      <a:r>
-                        <a:rPr lang="en-US" sz="1200" dirty="0" err="1" smtClean="0"/>
-                        <a:t>intronic</a:t>
-                      </a:r>
-                      <a:endParaRPr lang="en-US" sz="1200" dirty="0"/>
-                    </a:p>
-                  </a:txBody>
-                  <a:tcPr/>
-                </a:tc>
-                <a:tc>
-                  <a:txBody>
-                    <a:bodyPr/>
-                    <a:lstStyle/>
-                    <a:p>
-                      <a:r>
-                        <a:rPr lang="en-US" sz="1200" dirty="0" smtClean="0"/>
-                        <a:t>MCM6</a:t>
-                      </a:r>
-                      <a:endParaRPr lang="en-US" sz="1200" dirty="0"/>
-                    </a:p>
-                  </a:txBody>
-                  <a:tcPr/>
-                </a:tc>
-                <a:tc>
-                  <a:txBody>
-                    <a:bodyPr/>
-                    <a:lstStyle/>
-                    <a:p>
-                      <a:endParaRPr lang="en-US" sz="1200" dirty="0"/>
-                    </a:p>
-                  </a:txBody>
-                  <a:tcPr/>
-                </a:tc>
-                <a:tc>
-                  <a:txBody>
-                    <a:bodyPr/>
-                    <a:lstStyle/>
-                    <a:p>
-                      <a:endParaRPr lang="en-US" sz="1200" dirty="0"/>
-                    </a:p>
-                  </a:txBody>
-                  <a:tcPr/>
-                </a:tc>
-                <a:tc>
-                  <a:txBody>
-                    <a:bodyPr/>
-                    <a:lstStyle/>
-                    <a:p>
-                      <a:endParaRPr lang="en-US" sz="1200" dirty="0"/>
-                    </a:p>
-                  </a:txBody>
-                  <a:tcPr/>
-                </a:tc>
-                <a:tc>
-                  <a:txBody>
-                    <a:bodyPr/>
-                    <a:lstStyle/>
-                    <a:p>
-                      <a:pPr marL="0" marR="0" indent="0" algn="l" defTabSz="457200" rtl="0" eaLnBrk="1" fontAlgn="auto" latinLnBrk="0" hangingPunct="1">
-                        <a:lnSpc>
-                          <a:spcPct val="100000"/>
-                        </a:lnSpc>
-                        <a:spcBef>
-                          <a:spcPts val="0"/>
-                        </a:spcBef>
-                        <a:spcAft>
-                          <a:spcPts val="0"/>
-                        </a:spcAft>
-                        <a:buClrTx/>
-                        <a:buSzTx/>
-                        <a:buFontTx/>
-                        <a:buNone/>
-                        <a:tabLst/>
-                        <a:defRPr/>
-                      </a:pPr>
-                      <a:r>
-                        <a:rPr lang="en-US" sz="1200" dirty="0" smtClean="0"/>
-                        <a:t>rs4988235</a:t>
-                      </a:r>
-                    </a:p>
-                    <a:p>
-                      <a:endParaRPr lang="en-US" sz="1200" dirty="0"/>
-                    </a:p>
-                  </a:txBody>
-                  <a:tcPr/>
-                </a:tc>
-                <a:tc>
-                  <a:txBody>
-                    <a:bodyPr/>
-                    <a:lstStyle/>
-                    <a:p>
-                      <a:r>
-                        <a:rPr lang="en-US" sz="1200" dirty="0" smtClean="0"/>
-                        <a:t>0.161</a:t>
-                      </a:r>
-                      <a:endParaRPr lang="en-US" sz="1200" dirty="0"/>
-                    </a:p>
-                  </a:txBody>
-                  <a:tcPr/>
-                </a:tc>
-                <a:tc>
-                  <a:txBody>
-                    <a:bodyPr/>
-                    <a:lstStyle/>
-                    <a:p>
-                      <a:r>
-                        <a:rPr lang="en-US" sz="1200" dirty="0" smtClean="0"/>
-                        <a:t>0.508</a:t>
-                      </a:r>
-                      <a:endParaRPr lang="en-US" sz="1200" dirty="0"/>
-                    </a:p>
-                  </a:txBody>
-                  <a:tcPr/>
-                </a:tc>
-                <a:tc>
-                  <a:txBody>
-                    <a:bodyPr/>
-                    <a:lstStyle/>
-                    <a:p>
-                      <a:r>
-                        <a:rPr lang="en-US" sz="1200" dirty="0" smtClean="0"/>
-                        <a:t>0.03</a:t>
-                      </a:r>
-                      <a:endParaRPr lang="en-US" sz="1200" dirty="0"/>
-                    </a:p>
-                  </a:txBody>
-                  <a:tcPr/>
-                </a:tc>
-              </a:tr>
-            </a:tbl>
-          </a:graphicData>
-        </a:graphic>
-      </p:graphicFrame>
-      <p:pic>
-        <p:nvPicPr>
-          <p:cNvPr id="5" name="Picture 4" descr="Screen Shot 2018-09-05 at 14.53.58.png"/>
-          <p:cNvPicPr>
-            <a:picLocks noChangeAspect="1"/>
-          </p:cNvPicPr>
-          <p:nvPr/>
-        </p:nvPicPr>
-        <p:blipFill>
-          <a:blip r:embed="rId2">
-            <a:extLst>
-              <a:ext uri="{28A0092B-C50C-407E-A947-70E740481C1C}">
-                <a14:useLocalDpi xmlns:a14="http://schemas.microsoft.com/office/drawing/2010/main" val="0"/>
-              </a:ext>
-            </a:extLst>
-          </a:blip>
-          <a:stretch>
-            <a:fillRect/>
-          </a:stretch>
-        </p:blipFill>
-        <p:spPr>
-          <a:xfrm>
-            <a:off x="5978578" y="1952845"/>
-            <a:ext cx="3001819" cy="4846473"/>
-          </a:xfrm>
-          <a:prstGeom prst="rect">
-            <a:avLst/>
-          </a:prstGeom>
-        </p:spPr>
-      </p:pic>
-      <p:pic>
-        <p:nvPicPr>
-          <p:cNvPr id="6" name="Picture 5" descr="Screen Shot 2018-09-05 at 14.57.29.png"/>
-          <p:cNvPicPr>
-            <a:picLocks noChangeAspect="1"/>
-          </p:cNvPicPr>
-          <p:nvPr/>
-        </p:nvPicPr>
-        <p:blipFill>
-          <a:blip r:embed="rId3">
-            <a:extLst>
-              <a:ext uri="{28A0092B-C50C-407E-A947-70E740481C1C}">
-                <a14:useLocalDpi xmlns:a14="http://schemas.microsoft.com/office/drawing/2010/main" val="0"/>
-              </a:ext>
-            </a:extLst>
-          </a:blip>
-          <a:stretch>
-            <a:fillRect/>
-          </a:stretch>
-        </p:blipFill>
-        <p:spPr>
-          <a:xfrm>
-            <a:off x="0" y="2193406"/>
-            <a:ext cx="5910483" cy="4142183"/>
-          </a:xfrm>
-          <a:prstGeom prst="rect">
-            <a:avLst/>
-          </a:prstGeom>
-        </p:spPr>
-      </p:pic>
-      <p:sp>
-        <p:nvSpPr>
-          <p:cNvPr id="3" name="TextBox 2"/>
-          <p:cNvSpPr txBox="1"/>
-          <p:nvPr/>
-        </p:nvSpPr>
-        <p:spPr>
-          <a:xfrm>
-            <a:off x="7798334" y="6581001"/>
-            <a:ext cx="1345666" cy="276999"/>
-          </a:xfrm>
-          <a:prstGeom prst="rect">
-            <a:avLst/>
-          </a:prstGeom>
-          <a:noFill/>
-        </p:spPr>
-        <p:txBody>
-          <a:bodyPr wrap="none" rtlCol="0">
-            <a:spAutoFit/>
-          </a:bodyPr>
-          <a:lstStyle/>
-          <a:p>
-            <a:r>
-              <a:rPr lang="en-US" sz="1200" dirty="0" err="1" smtClean="0"/>
-              <a:t>Mattar</a:t>
-            </a:r>
-            <a:r>
-              <a:rPr lang="en-US" sz="1200" dirty="0" smtClean="0"/>
-              <a:t> et al., 2012</a:t>
-            </a:r>
-            <a:endParaRPr lang="en-US" sz="1200" dirty="0"/>
-          </a:p>
-        </p:txBody>
-      </p:sp>
-    </p:spTree>
-    <p:extLst>
-      <p:ext uri="{BB962C8B-B14F-4D97-AF65-F5344CB8AC3E}">
-        <p14:creationId xmlns:p14="http://schemas.microsoft.com/office/powerpoint/2010/main" val="1254315343"/>
-      </p:ext>
-    </p:extLst>
-  </p:cSld>
-  <p:clrMapOvr>
-    <a:masterClrMapping/>
-  </p:clrMapOvr>
-</p:sld>
-</file>
-
-<file path=ppt/slides/slide4.xml><?xml version="1.0" encoding="utf-8"?>
-<p:sld xmlns:a="http://schemas.openxmlformats.org/drawingml/2006/main" xmlns:r="http://schemas.openxmlformats.org/officeDocument/2006/relationships" xmlns:p="http://schemas.openxmlformats.org/presentationml/2006/main">
-  <p:cSld>
-    <p:spTree>
-      <p:nvGrpSpPr>
-        <p:cNvPr id="1" name=""/>
-        <p:cNvGrpSpPr/>
-        <p:nvPr/>
-      </p:nvGrpSpPr>
-      <p:grpSpPr>
-        <a:xfrm>
-          <a:off x="0" y="0"/>
-          <a:ext cx="0" cy="0"/>
-          <a:chOff x="0" y="0"/>
-          <a:chExt cx="0" cy="0"/>
-        </a:xfrm>
-      </p:grpSpPr>
-      <p:sp>
-        <p:nvSpPr>
-          <p:cNvPr id="2" name="Title 1"/>
-          <p:cNvSpPr>
-            <a:spLocks noGrp="1"/>
-          </p:cNvSpPr>
-          <p:nvPr>
-            <p:ph type="title"/>
-          </p:nvPr>
-        </p:nvSpPr>
-        <p:spPr>
-          <a:xfrm>
             <a:off x="457200" y="29323"/>
             <a:ext cx="8229600" cy="735483"/>
           </a:xfrm>
@@ -4547,10 +3214,9 @@
           <a:lstStyle/>
           <a:p>
             <a:r>
-              <a:rPr lang="en-US" dirty="0" smtClean="0"/>
+              <a:rPr lang="en-US" dirty="0"/>
               <a:t>IGV</a:t>
             </a:r>
-            <a:endParaRPr lang="en-US" dirty="0"/>
           </a:p>
         </p:txBody>
       </p:sp>
@@ -4606,34 +3272,26 @@
           <a:lstStyle/>
           <a:p>
             <a:r>
-              <a:rPr lang="en-US" smtClean="0"/>
+              <a:rPr lang="en-US"/>
               <a:t>Read length?</a:t>
             </a:r>
           </a:p>
           <a:p>
             <a:r>
-              <a:rPr lang="en-US" dirty="0" smtClean="0"/>
-              <a:t>Do </a:t>
-            </a:r>
-            <a:r>
-              <a:rPr lang="en-US" dirty="0" smtClean="0"/>
-              <a:t>we have decent coverage across the variant position?</a:t>
-            </a:r>
-          </a:p>
-          <a:p>
-            <a:r>
-              <a:rPr lang="en-US" dirty="0" smtClean="0"/>
+              <a:rPr lang="en-US" dirty="0"/>
+              <a:t>Do we have decent coverage across the variant position?</a:t>
+            </a:r>
+          </a:p>
+          <a:p>
+            <a:r>
+              <a:rPr lang="en-US" dirty="0"/>
               <a:t>Homozygotes/heterozygotes? </a:t>
             </a:r>
           </a:p>
           <a:p>
             <a:r>
-              <a:rPr lang="en-US" dirty="0" smtClean="0"/>
-              <a:t>Who can drink milk</a:t>
-            </a:r>
-            <a:r>
-              <a:rPr lang="en-US" dirty="0" smtClean="0"/>
-              <a:t>?</a:t>
+              <a:rPr lang="en-US" dirty="0"/>
+              <a:t>Who can drink milk?</a:t>
             </a:r>
           </a:p>
           <a:p>
@@ -4654,7 +3312,7 @@
 </p:sld>
 </file>
 
-<file path=ppt/slides/slide5.xml><?xml version="1.0" encoding="utf-8"?>
+<file path=ppt/slides/slide3.xml><?xml version="1.0" encoding="utf-8"?>
 <p:sld xmlns:a="http://schemas.openxmlformats.org/drawingml/2006/main" xmlns:r="http://schemas.openxmlformats.org/officeDocument/2006/relationships" xmlns:p="http://schemas.openxmlformats.org/presentationml/2006/main">
   <p:cSld>
     <p:spTree>
@@ -4694,10 +3352,9 @@
           <a:lstStyle/>
           <a:p>
             <a:r>
-              <a:rPr lang="en-US" dirty="0" smtClean="0"/>
+              <a:rPr lang="en-US" dirty="0"/>
               <a:t>IGV</a:t>
             </a:r>
-            <a:endParaRPr lang="en-US" dirty="0"/>
           </a:p>
         </p:txBody>
       </p:sp>
@@ -4895,7 +3552,7 @@
 </p:sld>
 </file>
 
-<file path=ppt/slides/slide6.xml><?xml version="1.0" encoding="utf-8"?>
+<file path=ppt/slides/slide4.xml><?xml version="1.0" encoding="utf-8"?>
 <p:sld xmlns:a="http://schemas.openxmlformats.org/drawingml/2006/main" xmlns:r="http://schemas.openxmlformats.org/officeDocument/2006/relationships" xmlns:p="http://schemas.openxmlformats.org/presentationml/2006/main">
   <p:cSld>
     <p:spTree>
@@ -4928,14 +3585,13 @@
           <a:lstStyle/>
           <a:p>
             <a:r>
-              <a:rPr lang="en-US" dirty="0" err="1" smtClean="0"/>
+              <a:rPr lang="en-US" dirty="0" err="1"/>
               <a:t>Vcf</a:t>
             </a:r>
             <a:r>
-              <a:rPr lang="en-US" dirty="0" smtClean="0"/>
+              <a:rPr lang="en-US" dirty="0"/>
               <a:t> files</a:t>
             </a:r>
-            <a:endParaRPr lang="en-US" dirty="0"/>
           </a:p>
         </p:txBody>
       </p:sp>
@@ -4965,7 +3621,7 @@
               <a:buNone/>
             </a:pPr>
             <a:r>
-              <a:rPr lang="en-US" sz="2400" dirty="0" smtClean="0"/>
+              <a:rPr lang="en-US" sz="2400" dirty="0"/>
               <a:t>Descriptions of each field can be found in the header section (lines starting with '#')</a:t>
             </a:r>
           </a:p>
@@ -4973,14 +3629,14 @@
             <a:pPr marL="457200" lvl="1" indent="0">
               <a:buNone/>
             </a:pPr>
-            <a:endParaRPr lang="en-US" dirty="0" smtClean="0"/>
+            <a:endParaRPr lang="en-US" dirty="0"/>
           </a:p>
           <a:p>
             <a:pPr marL="457200" lvl="1" indent="0">
               <a:buNone/>
             </a:pPr>
             <a:r>
-              <a:rPr lang="de-DE" sz="1600" dirty="0" smtClean="0">
+              <a:rPr lang="de-DE" sz="1600" dirty="0">
                 <a:solidFill>
                   <a:srgbClr val="008000"/>
                 </a:solidFill>
@@ -4988,11 +3644,11 @@
               <a:t>CHROM  POS     ID      REF     ALT     QUAL    FILTER  </a:t>
             </a:r>
             <a:r>
-              <a:rPr lang="de-DE" sz="1600" dirty="0" smtClean="0"/>
+              <a:rPr lang="de-DE" sz="1600" dirty="0"/>
               <a:t>INFO    FORMAT  </a:t>
             </a:r>
             <a:r>
-              <a:rPr lang="de-DE" sz="1600" dirty="0" smtClean="0">
+              <a:rPr lang="de-DE" sz="1600" dirty="0">
                 <a:solidFill>
                   <a:srgbClr val="FF0000"/>
                 </a:solidFill>
@@ -5005,7 +3661,7 @@
               <a:buNone/>
             </a:pPr>
             <a:r>
-              <a:rPr lang="de-DE" sz="1600" dirty="0" smtClean="0">
+              <a:rPr lang="de-DE" sz="1600" dirty="0">
                 <a:solidFill>
                   <a:srgbClr val="008000"/>
                 </a:solidFill>
@@ -5013,15 +3669,15 @@
               <a:t>2       136608646   .       G       A        628.02  PASS    </a:t>
             </a:r>
             <a:r>
-              <a:rPr lang="de-DE" sz="1600" dirty="0" smtClean="0"/>
+              <a:rPr lang="de-DE" sz="1600" dirty="0"/>
               <a:t>AC=3;AF=0.500;AN=6;BaseQRankSum=-3.410e-01;ClippingRankSum=0.00;DP=38;ExcessHet=1.5490;FS=3.211;MLEAC=3;MLEAF=0.500;MQ=60.00;MQRankSum=0.00;QD=20.26;ReadPosRankSum=-3.970e-01;SOR=1.037;set=</a:t>
             </a:r>
             <a:r>
-              <a:rPr lang="de-DE" sz="1600" dirty="0" err="1" smtClean="0"/>
+              <a:rPr lang="de-DE" sz="1600" dirty="0" err="1"/>
               <a:t>snp</a:t>
             </a:r>
             <a:r>
-              <a:rPr lang="de-DE" sz="1600" dirty="0" smtClean="0"/>
+              <a:rPr lang="de-DE" sz="1600" dirty="0"/>
               <a:t>        </a:t>
             </a:r>
           </a:p>
@@ -5030,7 +3686,7 @@
               <a:buNone/>
             </a:pPr>
             <a:r>
-              <a:rPr lang="de-DE" sz="1600" dirty="0" smtClean="0">
+              <a:rPr lang="de-DE" sz="1600" dirty="0">
                 <a:solidFill>
                   <a:srgbClr val="0000FF"/>
                 </a:solidFill>
@@ -5038,11 +3694,11 @@
               <a:t>GT</a:t>
             </a:r>
             <a:r>
-              <a:rPr lang="de-DE" sz="1600" dirty="0" smtClean="0"/>
+              <a:rPr lang="de-DE" sz="1600" dirty="0"/>
               <a:t>:AD:DP:GQ:PL  </a:t>
             </a:r>
             <a:r>
-              <a:rPr lang="de-DE" sz="1600" dirty="0" smtClean="0">
+              <a:rPr lang="de-DE" sz="1600" dirty="0">
                 <a:solidFill>
                   <a:srgbClr val="0000FF"/>
                 </a:solidFill>
@@ -5050,7 +3706,7 @@
               <a:t>1/1</a:t>
             </a:r>
             <a:r>
-              <a:rPr lang="de-DE" sz="1600" dirty="0" smtClean="0">
+              <a:rPr lang="de-DE" sz="1600" dirty="0">
                 <a:solidFill>
                   <a:srgbClr val="FF0000"/>
                 </a:solidFill>
@@ -5058,7 +3714,7 @@
               <a:t>:0,9:9:27:316,27,0       </a:t>
             </a:r>
             <a:r>
-              <a:rPr lang="de-DE" sz="1600" dirty="0" smtClean="0">
+              <a:rPr lang="de-DE" sz="1600" dirty="0">
                 <a:solidFill>
                   <a:srgbClr val="0000FF"/>
                 </a:solidFill>
@@ -5066,7 +3722,7 @@
               <a:t>0/1</a:t>
             </a:r>
             <a:r>
-              <a:rPr lang="de-DE" sz="1600" dirty="0" smtClean="0">
+              <a:rPr lang="de-DE" sz="1600" dirty="0">
                 <a:solidFill>
                   <a:srgbClr val="FF0000"/>
                 </a:solidFill>
@@ -5074,7 +3730,7 @@
               <a:t>:11,11:22:99:348,0,382        </a:t>
             </a:r>
             <a:r>
-              <a:rPr lang="de-DE" sz="1600" dirty="0" smtClean="0">
+              <a:rPr lang="de-DE" sz="1600" dirty="0">
                 <a:solidFill>
                   <a:srgbClr val="0000FF"/>
                 </a:solidFill>
@@ -5082,14 +3738,14 @@
               <a:t>0/0</a:t>
             </a:r>
             <a:r>
-              <a:rPr lang="de-DE" sz="1600" dirty="0" smtClean="0">
+              <a:rPr lang="de-DE" sz="1600" dirty="0">
                 <a:solidFill>
                   <a:srgbClr val="FF0000"/>
                 </a:solidFill>
               </a:rPr>
               <a:t>:7,0:7:21:0,21,223</a:t>
             </a:r>
-            <a:endParaRPr lang="en-US" sz="1600" dirty="0" smtClean="0">
+            <a:endParaRPr lang="en-US" sz="1600" dirty="0">
               <a:solidFill>
                 <a:srgbClr val="FF0000"/>
               </a:solidFill>
@@ -5110,7 +3766,7 @@
 </p:sld>
 </file>
 
-<file path=ppt/slides/slide7.xml><?xml version="1.0" encoding="utf-8"?>
+<file path=ppt/slides/slide5.xml><?xml version="1.0" encoding="utf-8"?>
 <p:sld xmlns:a="http://schemas.openxmlformats.org/drawingml/2006/main" xmlns:r="http://schemas.openxmlformats.org/officeDocument/2006/relationships" xmlns:p="http://schemas.openxmlformats.org/presentationml/2006/main">
   <p:cSld>
     <p:spTree>
@@ -5148,10 +3804,9 @@
           <a:lstStyle/>
           <a:p>
             <a:r>
-              <a:rPr lang="en-US" dirty="0" smtClean="0"/>
+              <a:rPr lang="en-US" dirty="0"/>
               <a:t>UCSC</a:t>
             </a:r>
-            <a:endParaRPr lang="en-US" dirty="0"/>
           </a:p>
         </p:txBody>
       </p:sp>
@@ -5178,10 +3833,9 @@
           <a:lstStyle/>
           <a:p>
             <a:r>
-              <a:rPr lang="en-US" sz="1800" dirty="0" smtClean="0"/>
+              <a:rPr lang="en-US" sz="1800" dirty="0"/>
               <a:t>Most species have the G allele, however squirrels and naked mole rat apparently have the A allele</a:t>
             </a:r>
-            <a:endParaRPr lang="en-US" sz="1800" dirty="0"/>
           </a:p>
         </p:txBody>
       </p:sp>
@@ -5267,7 +3921,7 @@
 </p:sld>
 </file>
 
-<file path=ppt/slides/slide8.xml><?xml version="1.0" encoding="utf-8"?>
+<file path=ppt/slides/slide6.xml><?xml version="1.0" encoding="utf-8"?>
 <p:sld xmlns:a="http://schemas.openxmlformats.org/drawingml/2006/main" xmlns:r="http://schemas.openxmlformats.org/officeDocument/2006/relationships" xmlns:p="http://schemas.openxmlformats.org/presentationml/2006/main">
   <p:cSld>
     <p:spTree>
@@ -5300,10 +3954,9 @@
           <a:lstStyle/>
           <a:p>
             <a:r>
-              <a:rPr lang="en-US" dirty="0" smtClean="0"/>
+              <a:rPr lang="en-US" dirty="0"/>
               <a:t>Questions</a:t>
             </a:r>
-            <a:endParaRPr lang="en-US" dirty="0"/>
           </a:p>
         </p:txBody>
       </p:sp>
@@ -5325,50 +3978,41 @@
           <a:lstStyle/>
           <a:p>
             <a:r>
-              <a:rPr lang="en-US" sz="2400" dirty="0" err="1" smtClean="0"/>
+              <a:rPr lang="en-US" sz="2400" dirty="0" err="1"/>
               <a:t>MarkDuplicates</a:t>
             </a:r>
             <a:r>
-              <a:rPr lang="en-US" sz="2400" dirty="0" smtClean="0"/>
-              <a:t>: 588 </a:t>
-            </a:r>
-            <a:r>
               <a:rPr lang="en-US" sz="2400" dirty="0"/>
-              <a:t>duplicate </a:t>
-            </a:r>
-            <a:r>
-              <a:rPr lang="en-US" sz="2400" dirty="0" smtClean="0"/>
-              <a:t>reads</a:t>
-            </a:r>
-          </a:p>
-          <a:p>
-            <a:r>
-              <a:rPr lang="en-US" sz="2400" dirty="0" smtClean="0"/>
+              <a:t>: 588 duplicate reads</a:t>
+            </a:r>
+          </a:p>
+          <a:p>
+            <a:r>
+              <a:rPr lang="en-US" sz="2400" dirty="0"/>
               <a:t>697 of the 711 variants passed the filters</a:t>
             </a:r>
           </a:p>
           <a:p>
             <a:r>
-              <a:rPr lang="en-US" sz="2400" dirty="0" smtClean="0"/>
+              <a:rPr lang="en-US" sz="2400" dirty="0"/>
               <a:t>108 variants are </a:t>
             </a:r>
             <a:r>
-              <a:rPr lang="en-US" sz="2400" dirty="0" err="1" smtClean="0"/>
+              <a:rPr lang="en-US" sz="2400" dirty="0" err="1"/>
               <a:t>indels</a:t>
             </a:r>
             <a:r>
-              <a:rPr lang="en-US" sz="2400" dirty="0" smtClean="0"/>
+              <a:rPr lang="en-US" sz="2400" dirty="0"/>
               <a:t> (use: --keep-only-</a:t>
             </a:r>
             <a:r>
-              <a:rPr lang="en-US" sz="2400" dirty="0" err="1" smtClean="0"/>
+              <a:rPr lang="en-US" sz="2400" dirty="0" err="1"/>
               <a:t>indels</a:t>
             </a:r>
             <a:r>
-              <a:rPr lang="en-US" sz="2400" dirty="0" smtClean="0"/>
+              <a:rPr lang="en-US" sz="2400" dirty="0"/>
               <a:t>)</a:t>
             </a:r>
-            <a:endParaRPr lang="en-US" sz="2400" dirty="0"/>
           </a:p>
         </p:txBody>
       </p:sp>
@@ -5385,7 +4029,7 @@
 </p:sld>
 </file>
 
-<file path=ppt/slides/slide9.xml><?xml version="1.0" encoding="utf-8"?>
+<file path=ppt/slides/slide7.xml><?xml version="1.0" encoding="utf-8"?>
 <p:sld xmlns:a="http://schemas.openxmlformats.org/drawingml/2006/main" xmlns:r="http://schemas.openxmlformats.org/officeDocument/2006/relationships" xmlns:p="http://schemas.openxmlformats.org/presentationml/2006/main">
   <p:cSld>
     <p:spTree>
@@ -5418,10 +4062,9 @@
           <a:lstStyle/>
           <a:p>
             <a:r>
-              <a:rPr lang="en-US" dirty="0" smtClean="0"/>
+              <a:rPr lang="en-US" dirty="0"/>
               <a:t>Warnings</a:t>
             </a:r>
-            <a:endParaRPr lang="en-US" dirty="0"/>
           </a:p>
         </p:txBody>
       </p:sp>
@@ -5443,82 +4086,53 @@
           <a:lstStyle/>
           <a:p>
             <a:r>
-              <a:rPr lang="en-US" dirty="0" smtClean="0"/>
+              <a:rPr lang="en-US" dirty="0"/>
               <a:t>Warnings are common, </a:t>
             </a:r>
             <a:r>
-              <a:rPr lang="en-US" dirty="0" err="1" smtClean="0"/>
+              <a:rPr lang="en-US" dirty="0" err="1"/>
               <a:t>google</a:t>
             </a:r>
             <a:r>
-              <a:rPr lang="en-US" dirty="0" smtClean="0"/>
+              <a:rPr lang="en-US" dirty="0"/>
               <a:t> them if you are not sure what they mean</a:t>
             </a:r>
-            <a:endParaRPr lang="en-US" dirty="0"/>
           </a:p>
           <a:p>
             <a:pPr lvl="1"/>
-            <a:r>
-              <a:rPr lang="en-US" dirty="0" err="1" smtClean="0"/>
-              <a:t>JointGenotyping</a:t>
-            </a:r>
-            <a:r>
-              <a:rPr lang="en-US" dirty="0" smtClean="0"/>
-              <a:t>: Some filters require heterozygote variants </a:t>
-            </a:r>
-          </a:p>
-          <a:p>
-            <a:pPr lvl="1"/>
-            <a:r>
-              <a:rPr lang="en-US" dirty="0"/>
-              <a:t>You </a:t>
-            </a:r>
-            <a:r>
-              <a:rPr lang="en-US" dirty="0" smtClean="0"/>
-              <a:t>probably got </a:t>
-            </a:r>
-            <a:r>
-              <a:rPr lang="en-US" dirty="0"/>
-              <a:t>a warning that optical duplicates were not discovered. This is because the read names are not properly formatted to be able to do </a:t>
-            </a:r>
-            <a:r>
-              <a:rPr lang="en-US" dirty="0" smtClean="0"/>
-              <a:t>this</a:t>
-            </a:r>
-          </a:p>
-          <a:p>
-            <a:pPr lvl="1"/>
-            <a:r>
-              <a:rPr lang="en-US" dirty="0" err="1" smtClean="0"/>
-              <a:t>Annovar</a:t>
-            </a:r>
-            <a:r>
-              <a:rPr lang="en-US" dirty="0" smtClean="0"/>
-              <a:t>: “1 </a:t>
-            </a:r>
-            <a:r>
-              <a:rPr lang="en-US" dirty="0"/>
-              <a:t>invalid alternative alleles found in input </a:t>
-            </a:r>
-            <a:r>
-              <a:rPr lang="en-US" dirty="0" smtClean="0"/>
-              <a:t>file” </a:t>
-            </a:r>
-            <a:r>
-              <a:rPr lang="en-US" dirty="0"/>
-              <a:t>(it is a '*', which is a symbol used by </a:t>
-            </a:r>
             <a:r>
               <a:rPr lang="en-US" dirty="0" err="1"/>
               <a:t>JointGenotyping</a:t>
             </a:r>
             <a:r>
               <a:rPr lang="en-US" dirty="0"/>
-              <a:t> when some samples have a SNP and others have </a:t>
-            </a:r>
-            <a:r>
-              <a:rPr lang="en-US" dirty="0" smtClean="0"/>
-              <a:t>an </a:t>
+              <a:t>: Some filters require heterozygote variants </a:t>
+            </a:r>
+          </a:p>
+          <a:p>
+            <a:pPr lvl="1"/>
+            <a:r>
+              <a:rPr lang="en-US" dirty="0"/>
+              <a:t>You probably got a warning that optical duplicates were not discovered. This is because the read names are not properly formatted to be able to do this</a:t>
+            </a:r>
+          </a:p>
+          <a:p>
+            <a:pPr lvl="1"/>
+            <a:r>
+              <a:rPr lang="en-US" dirty="0" err="1"/>
+              <a:t>Annovar</a:t>
+            </a:r>
+            <a:r>
+              <a:rPr lang="en-US" dirty="0"/>
+              <a:t>: “1 invalid alternative alleles found in input file” (it is a '*', which is a symbol used by </a:t>
+            </a:r>
+            <a:r>
+              <a:rPr lang="en-US" dirty="0" err="1"/>
+              <a:t>JointGenotyping</a:t>
+            </a:r>
+            <a:r>
+              <a:rPr lang="en-US" dirty="0"/>
+              <a:t> when some samples have a SNP and others have an </a:t>
             </a:r>
             <a:r>
               <a:rPr lang="en-US" dirty="0" err="1"/>

</xml_diff>